<commit_message>
finalizing part II [Thesis]
</commit_message>
<xml_diff>
--- a/Thesis/Part2/Chapter2/figures/SNARC Architecture.pptx
+++ b/Thesis/Part2/Chapter2/figures/SNARC Architecture.pptx
@@ -5,11 +5,12 @@
     <p:sldMasterId id="2147483648" r:id="rId1"/>
   </p:sldMasterIdLst>
   <p:notesMasterIdLst>
-    <p:notesMasterId r:id="rId4"/>
+    <p:notesMasterId r:id="rId5"/>
   </p:notesMasterIdLst>
   <p:sldIdLst>
     <p:sldId id="258" r:id="rId2"/>
     <p:sldId id="259" r:id="rId3"/>
+    <p:sldId id="260" r:id="rId4"/>
   </p:sldIdLst>
   <p:sldSz cx="9144000" cy="6858000" type="screen4x3"/>
   <p:notesSz cx="6858000" cy="9144000"/>
@@ -108,6 +109,22 @@
       </a:defRPr>
     </a:lvl9pPr>
   </p:defaultTextStyle>
+  <p:extLst>
+    <p:ext uri="{EFAFB233-063F-42B5-8137-9DF3F51BA10A}">
+      <p15:sldGuideLst xmlns:p15="http://schemas.microsoft.com/office/powerpoint/2012/main">
+        <p15:guide id="1" orient="horz" pos="2160">
+          <p15:clr>
+            <a:srgbClr val="A4A3A4"/>
+          </p15:clr>
+        </p15:guide>
+        <p15:guide id="2" pos="2880">
+          <p15:clr>
+            <a:srgbClr val="A4A3A4"/>
+          </p15:clr>
+        </p15:guide>
+      </p15:sldGuideLst>
+    </p:ext>
+  </p:extLst>
 </p:presentation>
 </file>
 
@@ -193,7 +210,7 @@
           <a:p>
             <a:fld id="{EA9E5D5B-9CA6-4330-B1E5-C82CDA515773}" type="datetimeFigureOut">
               <a:rPr lang="en-US" smtClean="0"/>
-              <a:t>4/9/2014</a:t>
+              <a:t>8/3/15</a:t>
             </a:fld>
             <a:endParaRPr lang="en-US"/>
           </a:p>
@@ -536,6 +553,11 @@
         </p:txBody>
       </p:sp>
     </p:spTree>
+    <p:extLst>
+      <p:ext uri="{BB962C8B-B14F-4D97-AF65-F5344CB8AC3E}">
+        <p14:creationId xmlns:p14="http://schemas.microsoft.com/office/powerpoint/2010/main" val="846930886"/>
+      </p:ext>
+    </p:extLst>
   </p:cSld>
   <p:clrMapOvr>
     <a:masterClrMapping/>
@@ -618,6 +640,98 @@
         </p:txBody>
       </p:sp>
     </p:spTree>
+    <p:extLst>
+      <p:ext uri="{BB962C8B-B14F-4D97-AF65-F5344CB8AC3E}">
+        <p14:creationId xmlns:p14="http://schemas.microsoft.com/office/powerpoint/2010/main" val="1681692777"/>
+      </p:ext>
+    </p:extLst>
+  </p:cSld>
+  <p:clrMapOvr>
+    <a:masterClrMapping/>
+  </p:clrMapOvr>
+</p:notes>
+</file>
+
+<file path=ppt/notesSlides/notesSlide3.xml><?xml version="1.0" encoding="utf-8"?>
+<p:notes xmlns:a="http://schemas.openxmlformats.org/drawingml/2006/main" xmlns:r="http://schemas.openxmlformats.org/officeDocument/2006/relationships" xmlns:p="http://schemas.openxmlformats.org/presentationml/2006/main">
+  <p:cSld>
+    <p:spTree>
+      <p:nvGrpSpPr>
+        <p:cNvPr id="1" name=""/>
+        <p:cNvGrpSpPr/>
+        <p:nvPr/>
+      </p:nvGrpSpPr>
+      <p:grpSpPr>
+        <a:xfrm>
+          <a:off x="0" y="0"/>
+          <a:ext cx="0" cy="0"/>
+          <a:chOff x="0" y="0"/>
+          <a:chExt cx="0" cy="0"/>
+        </a:xfrm>
+      </p:grpSpPr>
+      <p:sp>
+        <p:nvSpPr>
+          <p:cNvPr id="2" name="Slide Image Placeholder 1"/>
+          <p:cNvSpPr>
+            <a:spLocks noGrp="1" noRot="1" noChangeAspect="1"/>
+          </p:cNvSpPr>
+          <p:nvPr>
+            <p:ph type="sldImg"/>
+          </p:nvPr>
+        </p:nvSpPr>
+        <p:spPr/>
+      </p:sp>
+      <p:sp>
+        <p:nvSpPr>
+          <p:cNvPr id="3" name="Notes Placeholder 2"/>
+          <p:cNvSpPr>
+            <a:spLocks noGrp="1"/>
+          </p:cNvSpPr>
+          <p:nvPr>
+            <p:ph type="body" idx="1"/>
+          </p:nvPr>
+        </p:nvSpPr>
+        <p:spPr/>
+        <p:txBody>
+          <a:bodyPr>
+            <a:normAutofit/>
+          </a:bodyPr>
+          <a:lstStyle/>
+          <a:p>
+            <a:endParaRPr lang="en-US" dirty="0"/>
+          </a:p>
+        </p:txBody>
+      </p:sp>
+      <p:sp>
+        <p:nvSpPr>
+          <p:cNvPr id="4" name="Slide Number Placeholder 3"/>
+          <p:cNvSpPr>
+            <a:spLocks noGrp="1"/>
+          </p:cNvSpPr>
+          <p:nvPr>
+            <p:ph type="sldNum" sz="quarter" idx="10"/>
+          </p:nvPr>
+        </p:nvSpPr>
+        <p:spPr/>
+        <p:txBody>
+          <a:bodyPr/>
+          <a:lstStyle/>
+          <a:p>
+            <a:fld id="{7D8C2C35-2B8A-446E-BEC0-FD36716C29AC}" type="slidenum">
+              <a:rPr lang="en-US" smtClean="0"/>
+              <a:pPr/>
+              <a:t>3</a:t>
+            </a:fld>
+            <a:endParaRPr lang="en-US" dirty="0"/>
+          </a:p>
+        </p:txBody>
+      </p:sp>
+    </p:spTree>
+    <p:extLst>
+      <p:ext uri="{BB962C8B-B14F-4D97-AF65-F5344CB8AC3E}">
+        <p14:creationId xmlns:p14="http://schemas.microsoft.com/office/powerpoint/2010/main" val="294702567"/>
+      </p:ext>
+    </p:extLst>
   </p:cSld>
   <p:clrMapOvr>
     <a:masterClrMapping/>
@@ -806,7 +920,7 @@
           <a:p>
             <a:fld id="{39308254-63E3-4EBA-964F-8DC93013F1F6}" type="datetimeFigureOut">
               <a:rPr lang="en-US" smtClean="0"/>
-              <a:t>4/9/2014</a:t>
+              <a:t>8/3/15</a:t>
             </a:fld>
             <a:endParaRPr lang="en-US"/>
           </a:p>
@@ -976,7 +1090,7 @@
           <a:p>
             <a:fld id="{39308254-63E3-4EBA-964F-8DC93013F1F6}" type="datetimeFigureOut">
               <a:rPr lang="en-US" smtClean="0"/>
-              <a:t>4/9/2014</a:t>
+              <a:t>8/3/15</a:t>
             </a:fld>
             <a:endParaRPr lang="en-US"/>
           </a:p>
@@ -1156,7 +1270,7 @@
           <a:p>
             <a:fld id="{39308254-63E3-4EBA-964F-8DC93013F1F6}" type="datetimeFigureOut">
               <a:rPr lang="en-US" smtClean="0"/>
-              <a:t>4/9/2014</a:t>
+              <a:t>8/3/15</a:t>
             </a:fld>
             <a:endParaRPr lang="en-US"/>
           </a:p>
@@ -1440,7 +1554,7 @@
           <a:p>
             <a:fld id="{39308254-63E3-4EBA-964F-8DC93013F1F6}" type="datetimeFigureOut">
               <a:rPr lang="en-US" smtClean="0"/>
-              <a:t>4/9/2014</a:t>
+              <a:t>8/3/15</a:t>
             </a:fld>
             <a:endParaRPr lang="en-US"/>
           </a:p>
@@ -1686,7 +1800,7 @@
           <a:p>
             <a:fld id="{39308254-63E3-4EBA-964F-8DC93013F1F6}" type="datetimeFigureOut">
               <a:rPr lang="en-US" smtClean="0"/>
-              <a:t>4/9/2014</a:t>
+              <a:t>8/3/15</a:t>
             </a:fld>
             <a:endParaRPr lang="en-US"/>
           </a:p>
@@ -1974,7 +2088,7 @@
           <a:p>
             <a:fld id="{39308254-63E3-4EBA-964F-8DC93013F1F6}" type="datetimeFigureOut">
               <a:rPr lang="en-US" smtClean="0"/>
-              <a:t>4/9/2014</a:t>
+              <a:t>8/3/15</a:t>
             </a:fld>
             <a:endParaRPr lang="en-US"/>
           </a:p>
@@ -2396,7 +2510,7 @@
           <a:p>
             <a:fld id="{39308254-63E3-4EBA-964F-8DC93013F1F6}" type="datetimeFigureOut">
               <a:rPr lang="en-US" smtClean="0"/>
-              <a:t>4/9/2014</a:t>
+              <a:t>8/3/15</a:t>
             </a:fld>
             <a:endParaRPr lang="en-US"/>
           </a:p>
@@ -2514,7 +2628,7 @@
           <a:p>
             <a:fld id="{39308254-63E3-4EBA-964F-8DC93013F1F6}" type="datetimeFigureOut">
               <a:rPr lang="en-US" smtClean="0"/>
-              <a:t>4/9/2014</a:t>
+              <a:t>8/3/15</a:t>
             </a:fld>
             <a:endParaRPr lang="en-US"/>
           </a:p>
@@ -2609,7 +2723,7 @@
           <a:p>
             <a:fld id="{39308254-63E3-4EBA-964F-8DC93013F1F6}" type="datetimeFigureOut">
               <a:rPr lang="en-US" smtClean="0"/>
-              <a:t>4/9/2014</a:t>
+              <a:t>8/3/15</a:t>
             </a:fld>
             <a:endParaRPr lang="en-US"/>
           </a:p>
@@ -2886,7 +3000,7 @@
           <a:p>
             <a:fld id="{39308254-63E3-4EBA-964F-8DC93013F1F6}" type="datetimeFigureOut">
               <a:rPr lang="en-US" smtClean="0"/>
-              <a:t>4/9/2014</a:t>
+              <a:t>8/3/15</a:t>
             </a:fld>
             <a:endParaRPr lang="en-US"/>
           </a:p>
@@ -3139,7 +3253,7 @@
           <a:p>
             <a:fld id="{39308254-63E3-4EBA-964F-8DC93013F1F6}" type="datetimeFigureOut">
               <a:rPr lang="en-US" smtClean="0"/>
-              <a:t>4/9/2014</a:t>
+              <a:t>8/3/15</a:t>
             </a:fld>
             <a:endParaRPr lang="en-US"/>
           </a:p>
@@ -3352,7 +3466,7 @@
           <a:p>
             <a:fld id="{39308254-63E3-4EBA-964F-8DC93013F1F6}" type="datetimeFigureOut">
               <a:rPr lang="en-US" smtClean="0"/>
-              <a:t>4/9/2014</a:t>
+              <a:t>8/3/15</a:t>
             </a:fld>
             <a:endParaRPr lang="en-US"/>
           </a:p>
@@ -3742,7 +3856,9 @@
           <a:prstGeom prst="rect">
             <a:avLst/>
           </a:prstGeom>
-          <a:noFill/>
+          <a:solidFill>
+            <a:schemeClr val="tx1"/>
+          </a:solidFill>
           <a:ln w="3175">
             <a:solidFill>
               <a:schemeClr val="tx1"/>
@@ -3836,7 +3952,7 @@
         <p:spPr>
           <a:xfrm>
             <a:off x="1828800" y="4726145"/>
-            <a:ext cx="5486400" cy="261610"/>
+            <a:ext cx="5448300" cy="261610"/>
           </a:xfrm>
           <a:prstGeom prst="rect">
             <a:avLst/>
@@ -3988,7 +4104,11 @@
           <a:prstGeom prst="rect">
             <a:avLst/>
           </a:prstGeom>
-          <a:noFill/>
+          <a:solidFill>
+            <a:schemeClr val="bg1">
+              <a:lumMod val="50000"/>
+            </a:schemeClr>
+          </a:solidFill>
           <a:ln w="3175">
             <a:solidFill>
               <a:schemeClr val="tx1"/>
@@ -4017,6 +4137,9 @@
           <a:p>
             <a:pPr algn="ctr"/>
             <a:endParaRPr lang="en-US">
+              <a:solidFill>
+                <a:schemeClr val="bg1"/>
+              </a:solidFill>
               <a:latin typeface="Segoe UI Light" panose="020B0502040204020203" pitchFamily="34" charset="0"/>
             </a:endParaRPr>
           </a:p>
@@ -4183,7 +4306,9 @@
           <a:prstGeom prst="rect">
             <a:avLst/>
           </a:prstGeom>
-          <a:noFill/>
+          <a:solidFill>
+            <a:srgbClr val="F3F2D2"/>
+          </a:solidFill>
           <a:ln w="3175">
             <a:solidFill>
               <a:schemeClr val="tx1"/>
@@ -4231,7 +4356,9 @@
           <a:prstGeom prst="rect">
             <a:avLst/>
           </a:prstGeom>
-          <a:noFill/>
+          <a:solidFill>
+            <a:srgbClr val="F3F2D2"/>
+          </a:solidFill>
           <a:ln w="3175">
             <a:solidFill>
               <a:schemeClr val="tx1"/>
@@ -4279,7 +4406,9 @@
           <a:prstGeom prst="rect">
             <a:avLst/>
           </a:prstGeom>
-          <a:noFill/>
+          <a:solidFill>
+            <a:srgbClr val="F3F2D2"/>
+          </a:solidFill>
           <a:ln w="3175">
             <a:solidFill>
               <a:schemeClr val="tx1"/>
@@ -4327,7 +4456,9 @@
           <a:prstGeom prst="rect">
             <a:avLst/>
           </a:prstGeom>
-          <a:noFill/>
+          <a:solidFill>
+            <a:srgbClr val="F3F2D2"/>
+          </a:solidFill>
           <a:ln w="3175">
             <a:solidFill>
               <a:schemeClr val="tx1"/>
@@ -4375,7 +4506,9 @@
           <a:prstGeom prst="rect">
             <a:avLst/>
           </a:prstGeom>
-          <a:noFill/>
+          <a:solidFill>
+            <a:srgbClr val="F3F2D2"/>
+          </a:solidFill>
           <a:ln w="3175">
             <a:solidFill>
               <a:schemeClr val="tx1"/>
@@ -4423,7 +4556,9 @@
           <a:prstGeom prst="rect">
             <a:avLst/>
           </a:prstGeom>
-          <a:noFill/>
+          <a:solidFill>
+            <a:srgbClr val="F3F2D2"/>
+          </a:solidFill>
           <a:ln w="3175">
             <a:solidFill>
               <a:schemeClr val="tx1"/>
@@ -4471,7 +4606,9 @@
           <a:prstGeom prst="rect">
             <a:avLst/>
           </a:prstGeom>
-          <a:noFill/>
+          <a:solidFill>
+            <a:srgbClr val="F3F2D2"/>
+          </a:solidFill>
           <a:ln w="3175">
             <a:solidFill>
               <a:schemeClr val="tx1"/>
@@ -4529,11 +4666,17 @@
           <a:p>
             <a:r>
               <a:rPr lang="en-US" sz="1600" dirty="0" smtClean="0">
+                <a:solidFill>
+                  <a:schemeClr val="bg1"/>
+                </a:solidFill>
                 <a:latin typeface="Segoe UI Light" panose="020B0502040204020203" pitchFamily="34" charset="0"/>
               </a:rPr>
               <a:t>Semantic Document</a:t>
             </a:r>
             <a:endParaRPr lang="en-US" sz="1600" dirty="0">
+              <a:solidFill>
+                <a:schemeClr val="bg1"/>
+              </a:solidFill>
               <a:latin typeface="Segoe UI Light" panose="020B0502040204020203" pitchFamily="34" charset="0"/>
             </a:endParaRPr>
           </a:p>
@@ -4830,11 +4973,17 @@
           <a:p>
             <a:r>
               <a:rPr lang="en-US" sz="1100" dirty="0" smtClean="0">
+                <a:solidFill>
+                  <a:schemeClr val="bg1"/>
+                </a:solidFill>
                 <a:latin typeface="Segoe UI Light" panose="020B0502040204020203" pitchFamily="34" charset="0"/>
               </a:rPr>
               <a:t>Freebase</a:t>
             </a:r>
             <a:endParaRPr lang="en-US" sz="1100" dirty="0">
+              <a:solidFill>
+                <a:schemeClr val="bg1"/>
+              </a:solidFill>
               <a:latin typeface="Segoe UI Light" panose="020B0502040204020203" pitchFamily="34" charset="0"/>
             </a:endParaRPr>
           </a:p>
@@ -5106,7 +5255,7 @@
           <a:p>
             <a:pPr algn="ctr"/>
             <a:r>
-              <a:rPr lang="en-US" sz="1050" dirty="0" err="1" smtClean="0">
+              <a:rPr lang="en-US" sz="1050" dirty="0" smtClean="0">
                 <a:latin typeface="Segoe UI Light" panose="020B0502040204020203" pitchFamily="34" charset="0"/>
               </a:rPr>
               <a:t>StackExchange</a:t>
@@ -5200,7 +5349,9 @@
           <a:prstGeom prst="rect">
             <a:avLst/>
           </a:prstGeom>
-          <a:noFill/>
+          <a:solidFill>
+            <a:schemeClr val="tx1"/>
+          </a:solidFill>
         </p:spPr>
         <p:txBody>
           <a:bodyPr wrap="square" rtlCol="0">
@@ -5211,11 +5362,17 @@
             <a:pPr algn="ctr"/>
             <a:r>
               <a:rPr lang="en-US" sz="1100" dirty="0" smtClean="0">
+                <a:solidFill>
+                  <a:schemeClr val="bg1"/>
+                </a:solidFill>
                 <a:latin typeface="Segoe UI Light" panose="020B0502040204020203" pitchFamily="34" charset="0"/>
               </a:rPr>
               <a:t>Search Results</a:t>
             </a:r>
             <a:endParaRPr lang="en-US" sz="1100" dirty="0">
+              <a:solidFill>
+                <a:schemeClr val="bg1"/>
+              </a:solidFill>
               <a:latin typeface="Segoe UI Light" panose="020B0502040204020203" pitchFamily="34" charset="0"/>
             </a:endParaRPr>
           </a:p>
@@ -5499,7 +5656,7 @@
         <p:spPr>
           <a:xfrm>
             <a:off x="1813432" y="453642"/>
-            <a:ext cx="5501768" cy="308358"/>
+            <a:ext cx="5439655" cy="288508"/>
           </a:xfrm>
           <a:prstGeom prst="rect">
             <a:avLst/>
@@ -5600,7 +5757,9 @@
           <a:prstGeom prst="rect">
             <a:avLst/>
           </a:prstGeom>
-          <a:noFill/>
+          <a:solidFill>
+            <a:schemeClr val="tx1"/>
+          </a:solidFill>
         </p:spPr>
         <p:txBody>
           <a:bodyPr wrap="square" rtlCol="0">
@@ -5611,11 +5770,17 @@
             <a:pPr algn="ctr"/>
             <a:r>
               <a:rPr lang="en-US" sz="1600" dirty="0" smtClean="0">
+                <a:solidFill>
+                  <a:schemeClr val="bg1"/>
+                </a:solidFill>
                 <a:latin typeface="Segoe UI Light" panose="020B0502040204020203" pitchFamily="34" charset="0"/>
               </a:rPr>
               <a:t>Search Results</a:t>
             </a:r>
             <a:endParaRPr lang="en-US" sz="1600" dirty="0">
+              <a:solidFill>
+                <a:schemeClr val="bg1"/>
+              </a:solidFill>
               <a:latin typeface="Segoe UI Light" panose="020B0502040204020203" pitchFamily="34" charset="0"/>
             </a:endParaRPr>
           </a:p>
@@ -6039,6 +6204,9 @@
             <a:chOff x="1766687" y="2514600"/>
             <a:chExt cx="5495045" cy="261610"/>
           </a:xfrm>
+          <a:solidFill>
+            <a:schemeClr val="tx1"/>
+          </a:solidFill>
         </p:grpSpPr>
         <p:sp>
           <p:nvSpPr>
@@ -6054,7 +6222,7 @@
             <a:prstGeom prst="rect">
               <a:avLst/>
             </a:prstGeom>
-            <a:noFill/>
+            <a:grpFill/>
             <a:ln w="3175">
               <a:solidFill>
                 <a:schemeClr val="tx1"/>
@@ -6102,6 +6270,770 @@
             <a:prstGeom prst="rect">
               <a:avLst/>
             </a:prstGeom>
+            <a:grpFill/>
+          </p:spPr>
+          <p:txBody>
+            <a:bodyPr wrap="square" rtlCol="0">
+              <a:spAutoFit/>
+            </a:bodyPr>
+            <a:lstStyle/>
+            <a:p>
+              <a:pPr algn="ctr"/>
+              <a:r>
+                <a:rPr lang="en-US" sz="1100" dirty="0" smtClean="0">
+                  <a:solidFill>
+                    <a:schemeClr val="bg1"/>
+                  </a:solidFill>
+                  <a:latin typeface="Segoe UI Light" panose="020B0502040204020203" pitchFamily="34" charset="0"/>
+                </a:rPr>
+                <a:t>Parsed Results</a:t>
+              </a:r>
+              <a:endParaRPr lang="en-US" sz="1100" dirty="0">
+                <a:solidFill>
+                  <a:schemeClr val="bg1"/>
+                </a:solidFill>
+                <a:latin typeface="Segoe UI Light" panose="020B0502040204020203" pitchFamily="34" charset="0"/>
+              </a:endParaRPr>
+            </a:p>
+          </p:txBody>
+        </p:sp>
+      </p:grpSp>
+    </p:spTree>
+    <p:extLst>
+      <p:ext uri="{BB962C8B-B14F-4D97-AF65-F5344CB8AC3E}">
+        <p14:creationId xmlns:p14="http://schemas.microsoft.com/office/powerpoint/2010/main" val="1565466361"/>
+      </p:ext>
+    </p:extLst>
+  </p:cSld>
+  <p:clrMapOvr>
+    <a:masterClrMapping/>
+  </p:clrMapOvr>
+  <p:transition spd="med"/>
+  <p:timing>
+    <p:tnLst>
+      <p:par>
+        <p:cTn id="1" dur="indefinite" restart="never" nodeType="tmRoot"/>
+      </p:par>
+    </p:tnLst>
+  </p:timing>
+</p:sld>
+</file>
+
+<file path=ppt/slides/slide3.xml><?xml version="1.0" encoding="utf-8"?>
+<p:sld xmlns:a="http://schemas.openxmlformats.org/drawingml/2006/main" xmlns:r="http://schemas.openxmlformats.org/officeDocument/2006/relationships" xmlns:p="http://schemas.openxmlformats.org/presentationml/2006/main">
+  <p:cSld>
+    <p:spTree>
+      <p:nvGrpSpPr>
+        <p:cNvPr id="1" name=""/>
+        <p:cNvGrpSpPr/>
+        <p:nvPr/>
+      </p:nvGrpSpPr>
+      <p:grpSpPr>
+        <a:xfrm>
+          <a:off x="0" y="0"/>
+          <a:ext cx="0" cy="0"/>
+          <a:chOff x="0" y="0"/>
+          <a:chExt cx="0" cy="0"/>
+        </a:xfrm>
+      </p:grpSpPr>
+      <p:sp>
+        <p:nvSpPr>
+          <p:cNvPr id="73" name="Rectangle 72"/>
+          <p:cNvSpPr/>
+          <p:nvPr/>
+        </p:nvSpPr>
+        <p:spPr>
+          <a:xfrm>
+            <a:off x="1219200" y="1005328"/>
+            <a:ext cx="6705600" cy="1509272"/>
+          </a:xfrm>
+          <a:prstGeom prst="rect">
+            <a:avLst/>
+          </a:prstGeom>
+          <a:noFill/>
+          <a:ln w="3175">
+            <a:solidFill>
+              <a:schemeClr val="bg1">
+                <a:lumMod val="75000"/>
+              </a:schemeClr>
+            </a:solidFill>
+            <a:prstDash val="dash"/>
+          </a:ln>
+        </p:spPr>
+        <p:style>
+          <a:lnRef idx="2">
+            <a:schemeClr val="accent1">
+              <a:shade val="50000"/>
+            </a:schemeClr>
+          </a:lnRef>
+          <a:fillRef idx="1">
+            <a:schemeClr val="accent1"/>
+          </a:fillRef>
+          <a:effectRef idx="0">
+            <a:schemeClr val="accent1"/>
+          </a:effectRef>
+          <a:fontRef idx="minor">
+            <a:schemeClr val="lt1"/>
+          </a:fontRef>
+        </p:style>
+        <p:txBody>
+          <a:bodyPr rtlCol="0" anchor="ctr"/>
+          <a:lstStyle/>
+          <a:p>
+            <a:pPr algn="ctr"/>
+            <a:endParaRPr lang="en-US">
+              <a:latin typeface="Segoe UI Light" panose="020B0502040204020203" pitchFamily="34" charset="0"/>
+            </a:endParaRPr>
+          </a:p>
+        </p:txBody>
+      </p:sp>
+      <p:sp>
+        <p:nvSpPr>
+          <p:cNvPr id="26" name="Rectangle 25"/>
+          <p:cNvSpPr/>
+          <p:nvPr/>
+        </p:nvSpPr>
+        <p:spPr>
+          <a:xfrm>
+            <a:off x="1813432" y="453642"/>
+            <a:ext cx="5439655" cy="288508"/>
+          </a:xfrm>
+          <a:prstGeom prst="rect">
+            <a:avLst/>
+          </a:prstGeom>
+          <a:noFill/>
+          <a:ln w="3175">
+            <a:solidFill>
+              <a:schemeClr val="tx1"/>
+            </a:solidFill>
+          </a:ln>
+        </p:spPr>
+        <p:style>
+          <a:lnRef idx="2">
+            <a:schemeClr val="accent1">
+              <a:shade val="50000"/>
+            </a:schemeClr>
+          </a:lnRef>
+          <a:fillRef idx="1">
+            <a:schemeClr val="accent1"/>
+          </a:fillRef>
+          <a:effectRef idx="0">
+            <a:schemeClr val="accent1"/>
+          </a:effectRef>
+          <a:fontRef idx="minor">
+            <a:schemeClr val="lt1"/>
+          </a:fontRef>
+        </p:style>
+        <p:txBody>
+          <a:bodyPr rtlCol="0" anchor="ctr"/>
+          <a:lstStyle/>
+          <a:p>
+            <a:pPr algn="ctr"/>
+            <a:endParaRPr lang="en-US">
+              <a:latin typeface="Segoe UI Light" panose="020B0502040204020203" pitchFamily="34" charset="0"/>
+            </a:endParaRPr>
+          </a:p>
+        </p:txBody>
+      </p:sp>
+      <p:sp>
+        <p:nvSpPr>
+          <p:cNvPr id="2" name="TextBox 1"/>
+          <p:cNvSpPr txBox="1"/>
+          <p:nvPr/>
+        </p:nvSpPr>
+        <p:spPr>
+          <a:xfrm>
+            <a:off x="1828800" y="423446"/>
+            <a:ext cx="5448300" cy="338554"/>
+          </a:xfrm>
+          <a:prstGeom prst="rect">
+            <a:avLst/>
+          </a:prstGeom>
+          <a:solidFill>
+            <a:schemeClr val="tx1"/>
+          </a:solidFill>
+        </p:spPr>
+        <p:txBody>
+          <a:bodyPr wrap="square" rtlCol="0">
+            <a:spAutoFit/>
+          </a:bodyPr>
+          <a:lstStyle/>
+          <a:p>
+            <a:pPr algn="ctr"/>
+            <a:r>
+              <a:rPr lang="en-US" sz="1600" dirty="0" smtClean="0">
+                <a:solidFill>
+                  <a:schemeClr val="bg1"/>
+                </a:solidFill>
+                <a:latin typeface="Segoe UI Light" panose="020B0502040204020203" pitchFamily="34" charset="0"/>
+              </a:rPr>
+              <a:t>Web URL</a:t>
+            </a:r>
+            <a:endParaRPr lang="en-US" sz="1600" dirty="0">
+              <a:solidFill>
+                <a:schemeClr val="bg1"/>
+              </a:solidFill>
+              <a:latin typeface="Segoe UI Light" panose="020B0502040204020203" pitchFamily="34" charset="0"/>
+            </a:endParaRPr>
+          </a:p>
+        </p:txBody>
+      </p:sp>
+      <p:sp>
+        <p:nvSpPr>
+          <p:cNvPr id="19" name="TextBox 18"/>
+          <p:cNvSpPr txBox="1"/>
+          <p:nvPr/>
+        </p:nvSpPr>
+        <p:spPr>
+          <a:xfrm>
+            <a:off x="6673448" y="1025355"/>
+            <a:ext cx="1789740" cy="261610"/>
+          </a:xfrm>
+          <a:prstGeom prst="rect">
+            <a:avLst/>
+          </a:prstGeom>
+          <a:noFill/>
+        </p:spPr>
+        <p:txBody>
+          <a:bodyPr wrap="square" rtlCol="0">
+            <a:spAutoFit/>
+          </a:bodyPr>
+          <a:lstStyle/>
+          <a:p>
+            <a:r>
+              <a:rPr lang="en-US" sz="1100" b="1" dirty="0" smtClean="0">
+                <a:latin typeface="Segoe UI Light" panose="020B0502040204020203" pitchFamily="34" charset="0"/>
+              </a:rPr>
+              <a:t>Document Handler</a:t>
+            </a:r>
+            <a:endParaRPr lang="en-US" sz="1100" b="1" dirty="0">
+              <a:latin typeface="Segoe UI Light" panose="020B0502040204020203" pitchFamily="34" charset="0"/>
+            </a:endParaRPr>
+          </a:p>
+        </p:txBody>
+      </p:sp>
+      <p:sp>
+        <p:nvSpPr>
+          <p:cNvPr id="20" name="TextBox 19"/>
+          <p:cNvSpPr txBox="1"/>
+          <p:nvPr/>
+        </p:nvSpPr>
+        <p:spPr>
+          <a:xfrm>
+            <a:off x="3903808" y="1498448"/>
+            <a:ext cx="1332539" cy="523220"/>
+          </a:xfrm>
+          <a:prstGeom prst="rect">
+            <a:avLst/>
+          </a:prstGeom>
+          <a:noFill/>
+        </p:spPr>
+        <p:txBody>
+          <a:bodyPr wrap="square" rtlCol="0">
+            <a:spAutoFit/>
+          </a:bodyPr>
+          <a:lstStyle/>
+          <a:p>
+            <a:pPr algn="ctr"/>
+            <a:r>
+              <a:rPr lang="en-US" sz="1400" dirty="0" smtClean="0">
+                <a:latin typeface="Segoe UI Light" panose="020B0502040204020203" pitchFamily="34" charset="0"/>
+              </a:rPr>
+              <a:t>Language Detector</a:t>
+            </a:r>
+            <a:endParaRPr lang="en-US" sz="1400" dirty="0">
+              <a:latin typeface="Segoe UI Light" panose="020B0502040204020203" pitchFamily="34" charset="0"/>
+            </a:endParaRPr>
+          </a:p>
+        </p:txBody>
+      </p:sp>
+      <p:cxnSp>
+        <p:nvCxnSpPr>
+          <p:cNvPr id="4" name="Straight Arrow Connector 3"/>
+          <p:cNvCxnSpPr/>
+          <p:nvPr/>
+        </p:nvCxnSpPr>
+        <p:spPr>
+          <a:xfrm>
+            <a:off x="4552950" y="762000"/>
+            <a:ext cx="0" cy="243328"/>
+          </a:xfrm>
+          <a:prstGeom prst="straightConnector1">
+            <a:avLst/>
+          </a:prstGeom>
+          <a:ln>
+            <a:solidFill>
+              <a:schemeClr val="tx1"/>
+            </a:solidFill>
+            <a:tailEnd type="arrow"/>
+          </a:ln>
+        </p:spPr>
+        <p:style>
+          <a:lnRef idx="1">
+            <a:schemeClr val="accent1"/>
+          </a:lnRef>
+          <a:fillRef idx="0">
+            <a:schemeClr val="accent1"/>
+          </a:fillRef>
+          <a:effectRef idx="0">
+            <a:schemeClr val="accent1"/>
+          </a:effectRef>
+          <a:fontRef idx="minor">
+            <a:schemeClr val="tx1"/>
+          </a:fontRef>
+        </p:style>
+      </p:cxnSp>
+      <p:cxnSp>
+        <p:nvCxnSpPr>
+          <p:cNvPr id="50" name="Straight Arrow Connector 49"/>
+          <p:cNvCxnSpPr/>
+          <p:nvPr/>
+        </p:nvCxnSpPr>
+        <p:spPr>
+          <a:xfrm>
+            <a:off x="4495800" y="2514600"/>
+            <a:ext cx="0" cy="190500"/>
+          </a:xfrm>
+          <a:prstGeom prst="straightConnector1">
+            <a:avLst/>
+          </a:prstGeom>
+          <a:ln>
+            <a:solidFill>
+              <a:schemeClr val="tx1"/>
+            </a:solidFill>
+            <a:tailEnd type="arrow"/>
+          </a:ln>
+        </p:spPr>
+        <p:style>
+          <a:lnRef idx="1">
+            <a:schemeClr val="accent1"/>
+          </a:lnRef>
+          <a:fillRef idx="0">
+            <a:schemeClr val="accent1"/>
+          </a:fillRef>
+          <a:effectRef idx="0">
+            <a:schemeClr val="accent1"/>
+          </a:effectRef>
+          <a:fontRef idx="minor">
+            <a:schemeClr val="tx1"/>
+          </a:fontRef>
+        </p:style>
+      </p:cxnSp>
+      <p:sp>
+        <p:nvSpPr>
+          <p:cNvPr id="43" name="Rectangle 42"/>
+          <p:cNvSpPr/>
+          <p:nvPr/>
+        </p:nvSpPr>
+        <p:spPr>
+          <a:xfrm>
+            <a:off x="3925260" y="1262103"/>
+            <a:ext cx="1293479" cy="1066800"/>
+          </a:xfrm>
+          <a:prstGeom prst="rect">
+            <a:avLst/>
+          </a:prstGeom>
+          <a:noFill/>
+          <a:ln w="3175">
+            <a:solidFill>
+              <a:schemeClr val="tx1"/>
+            </a:solidFill>
+          </a:ln>
+        </p:spPr>
+        <p:style>
+          <a:lnRef idx="2">
+            <a:schemeClr val="accent1">
+              <a:shade val="50000"/>
+            </a:schemeClr>
+          </a:lnRef>
+          <a:fillRef idx="1">
+            <a:schemeClr val="accent1"/>
+          </a:fillRef>
+          <a:effectRef idx="0">
+            <a:schemeClr val="accent1"/>
+          </a:effectRef>
+          <a:fontRef idx="minor">
+            <a:schemeClr val="lt1"/>
+          </a:fontRef>
+        </p:style>
+        <p:txBody>
+          <a:bodyPr rtlCol="0" anchor="ctr"/>
+          <a:lstStyle/>
+          <a:p>
+            <a:pPr algn="ctr"/>
+            <a:endParaRPr lang="en-US">
+              <a:latin typeface="Segoe UI Light" panose="020B0502040204020203" pitchFamily="34" charset="0"/>
+            </a:endParaRPr>
+          </a:p>
+        </p:txBody>
+      </p:sp>
+      <p:sp>
+        <p:nvSpPr>
+          <p:cNvPr id="47" name="Rectangle 46"/>
+          <p:cNvSpPr/>
+          <p:nvPr/>
+        </p:nvSpPr>
+        <p:spPr>
+          <a:xfrm>
+            <a:off x="5486400" y="1275550"/>
+            <a:ext cx="2286000" cy="1066800"/>
+          </a:xfrm>
+          <a:prstGeom prst="rect">
+            <a:avLst/>
+          </a:prstGeom>
+          <a:noFill/>
+          <a:ln w="3175">
+            <a:solidFill>
+              <a:schemeClr val="tx1"/>
+            </a:solidFill>
+          </a:ln>
+        </p:spPr>
+        <p:style>
+          <a:lnRef idx="2">
+            <a:schemeClr val="accent1">
+              <a:shade val="50000"/>
+            </a:schemeClr>
+          </a:lnRef>
+          <a:fillRef idx="1">
+            <a:schemeClr val="accent1"/>
+          </a:fillRef>
+          <a:effectRef idx="0">
+            <a:schemeClr val="accent1"/>
+          </a:effectRef>
+          <a:fontRef idx="minor">
+            <a:schemeClr val="lt1"/>
+          </a:fontRef>
+        </p:style>
+        <p:txBody>
+          <a:bodyPr rtlCol="0" anchor="ctr"/>
+          <a:lstStyle/>
+          <a:p>
+            <a:pPr algn="ctr"/>
+            <a:endParaRPr lang="en-US">
+              <a:latin typeface="Segoe UI Light" panose="020B0502040204020203" pitchFamily="34" charset="0"/>
+            </a:endParaRPr>
+          </a:p>
+        </p:txBody>
+      </p:sp>
+      <p:grpSp>
+        <p:nvGrpSpPr>
+          <p:cNvPr id="5" name="Group 4"/>
+          <p:cNvGrpSpPr/>
+          <p:nvPr/>
+        </p:nvGrpSpPr>
+        <p:grpSpPr>
+          <a:xfrm>
+            <a:off x="1447800" y="1295400"/>
+            <a:ext cx="1332539" cy="1066800"/>
+            <a:chOff x="1447800" y="1295400"/>
+            <a:chExt cx="1332539" cy="1066800"/>
+          </a:xfrm>
+        </p:grpSpPr>
+        <p:sp>
+          <p:nvSpPr>
+            <p:cNvPr id="75" name="Rectangle 74"/>
+            <p:cNvSpPr/>
+            <p:nvPr/>
+          </p:nvSpPr>
+          <p:spPr>
+            <a:xfrm>
+              <a:off x="1447800" y="1295400"/>
+              <a:ext cx="1295400" cy="1066800"/>
+            </a:xfrm>
+            <a:prstGeom prst="rect">
+              <a:avLst/>
+            </a:prstGeom>
+            <a:noFill/>
+            <a:ln w="3175">
+              <a:solidFill>
+                <a:schemeClr val="tx1"/>
+              </a:solidFill>
+            </a:ln>
+          </p:spPr>
+          <p:style>
+            <a:lnRef idx="2">
+              <a:schemeClr val="accent1">
+                <a:shade val="50000"/>
+              </a:schemeClr>
+            </a:lnRef>
+            <a:fillRef idx="1">
+              <a:schemeClr val="accent1"/>
+            </a:fillRef>
+            <a:effectRef idx="0">
+              <a:schemeClr val="accent1"/>
+            </a:effectRef>
+            <a:fontRef idx="minor">
+              <a:schemeClr val="lt1"/>
+            </a:fontRef>
+          </p:style>
+          <p:txBody>
+            <a:bodyPr rtlCol="0" anchor="ctr"/>
+            <a:lstStyle/>
+            <a:p>
+              <a:pPr algn="ctr"/>
+              <a:endParaRPr lang="en-US">
+                <a:latin typeface="Segoe UI Light" panose="020B0502040204020203" pitchFamily="34" charset="0"/>
+              </a:endParaRPr>
+            </a:p>
+          </p:txBody>
+        </p:sp>
+        <p:sp>
+          <p:nvSpPr>
+            <p:cNvPr id="48" name="TextBox 47"/>
+            <p:cNvSpPr txBox="1"/>
+            <p:nvPr/>
+          </p:nvSpPr>
+          <p:spPr>
+            <a:xfrm>
+              <a:off x="1447800" y="1606169"/>
+              <a:ext cx="1332539" cy="307777"/>
+            </a:xfrm>
+            <a:prstGeom prst="rect">
+              <a:avLst/>
+            </a:prstGeom>
+            <a:noFill/>
+          </p:spPr>
+          <p:txBody>
+            <a:bodyPr wrap="square" rtlCol="0">
+              <a:spAutoFit/>
+            </a:bodyPr>
+            <a:lstStyle/>
+            <a:p>
+              <a:pPr algn="ctr"/>
+              <a:r>
+                <a:rPr lang="en-US" sz="1400" dirty="0" smtClean="0">
+                  <a:latin typeface="Segoe UI Light" panose="020B0502040204020203" pitchFamily="34" charset="0"/>
+                </a:rPr>
+                <a:t>Text Extractor</a:t>
+              </a:r>
+              <a:endParaRPr lang="en-US" sz="1400" dirty="0">
+                <a:latin typeface="Segoe UI Light" panose="020B0502040204020203" pitchFamily="34" charset="0"/>
+              </a:endParaRPr>
+            </a:p>
+          </p:txBody>
+        </p:sp>
+      </p:grpSp>
+      <p:sp>
+        <p:nvSpPr>
+          <p:cNvPr id="49" name="TextBox 48"/>
+          <p:cNvSpPr txBox="1"/>
+          <p:nvPr/>
+        </p:nvSpPr>
+        <p:spPr>
+          <a:xfrm>
+            <a:off x="5523539" y="1524000"/>
+            <a:ext cx="1332539" cy="523220"/>
+          </a:xfrm>
+          <a:prstGeom prst="rect">
+            <a:avLst/>
+          </a:prstGeom>
+          <a:noFill/>
+        </p:spPr>
+        <p:txBody>
+          <a:bodyPr wrap="square" rtlCol="0">
+            <a:spAutoFit/>
+          </a:bodyPr>
+          <a:lstStyle/>
+          <a:p>
+            <a:pPr algn="ctr"/>
+            <a:r>
+              <a:rPr lang="en-US" sz="1400" dirty="0" smtClean="0">
+                <a:latin typeface="Segoe UI Light" panose="020B0502040204020203" pitchFamily="34" charset="0"/>
+              </a:rPr>
+              <a:t>Semantic Annotator</a:t>
+            </a:r>
+            <a:endParaRPr lang="en-US" sz="1400" dirty="0">
+              <a:latin typeface="Segoe UI Light" panose="020B0502040204020203" pitchFamily="34" charset="0"/>
+            </a:endParaRPr>
+          </a:p>
+        </p:txBody>
+      </p:sp>
+      <p:grpSp>
+        <p:nvGrpSpPr>
+          <p:cNvPr id="51" name="Group 50"/>
+          <p:cNvGrpSpPr/>
+          <p:nvPr/>
+        </p:nvGrpSpPr>
+        <p:grpSpPr>
+          <a:xfrm>
+            <a:off x="1758042" y="2812386"/>
+            <a:ext cx="5495045" cy="261610"/>
+            <a:chOff x="1766687" y="2514600"/>
+            <a:chExt cx="5495045" cy="261610"/>
+          </a:xfrm>
+          <a:solidFill>
+            <a:schemeClr val="tx1"/>
+          </a:solidFill>
+        </p:grpSpPr>
+        <p:sp>
+          <p:nvSpPr>
+            <p:cNvPr id="52" name="Rectangle 51"/>
+            <p:cNvSpPr/>
+            <p:nvPr/>
+          </p:nvSpPr>
+          <p:spPr>
+            <a:xfrm>
+              <a:off x="1766687" y="2514600"/>
+              <a:ext cx="5486400" cy="261610"/>
+            </a:xfrm>
+            <a:prstGeom prst="rect">
+              <a:avLst/>
+            </a:prstGeom>
+            <a:grpFill/>
+            <a:ln w="3175">
+              <a:solidFill>
+                <a:schemeClr val="tx1"/>
+              </a:solidFill>
+            </a:ln>
+          </p:spPr>
+          <p:style>
+            <a:lnRef idx="2">
+              <a:schemeClr val="accent1">
+                <a:shade val="50000"/>
+              </a:schemeClr>
+            </a:lnRef>
+            <a:fillRef idx="1">
+              <a:schemeClr val="accent1"/>
+            </a:fillRef>
+            <a:effectRef idx="0">
+              <a:schemeClr val="accent1"/>
+            </a:effectRef>
+            <a:fontRef idx="minor">
+              <a:schemeClr val="lt1"/>
+            </a:fontRef>
+          </p:style>
+          <p:txBody>
+            <a:bodyPr rtlCol="0" anchor="ctr"/>
+            <a:lstStyle/>
+            <a:p>
+              <a:pPr algn="ctr"/>
+              <a:endParaRPr lang="en-US">
+                <a:latin typeface="Segoe UI Light" panose="020B0502040204020203" pitchFamily="34" charset="0"/>
+              </a:endParaRPr>
+            </a:p>
+          </p:txBody>
+        </p:sp>
+        <p:sp>
+          <p:nvSpPr>
+            <p:cNvPr id="53" name="TextBox 52"/>
+            <p:cNvSpPr txBox="1"/>
+            <p:nvPr/>
+          </p:nvSpPr>
+          <p:spPr>
+            <a:xfrm>
+              <a:off x="1813432" y="2514600"/>
+              <a:ext cx="5448300" cy="261610"/>
+            </a:xfrm>
+            <a:prstGeom prst="rect">
+              <a:avLst/>
+            </a:prstGeom>
+            <a:grpFill/>
+          </p:spPr>
+          <p:txBody>
+            <a:bodyPr wrap="square" rtlCol="0">
+              <a:spAutoFit/>
+            </a:bodyPr>
+            <a:lstStyle/>
+            <a:p>
+              <a:pPr algn="ctr"/>
+              <a:r>
+                <a:rPr lang="en-US" sz="1100" dirty="0" smtClean="0">
+                  <a:solidFill>
+                    <a:schemeClr val="bg1"/>
+                  </a:solidFill>
+                  <a:latin typeface="Segoe UI Light" panose="020B0502040204020203" pitchFamily="34" charset="0"/>
+                </a:rPr>
+                <a:t>Semantic Document</a:t>
+              </a:r>
+              <a:endParaRPr lang="en-US" sz="1100" dirty="0">
+                <a:solidFill>
+                  <a:schemeClr val="bg1"/>
+                </a:solidFill>
+                <a:latin typeface="Segoe UI Light" panose="020B0502040204020203" pitchFamily="34" charset="0"/>
+              </a:endParaRPr>
+            </a:p>
+          </p:txBody>
+        </p:sp>
+      </p:grpSp>
+      <p:grpSp>
+        <p:nvGrpSpPr>
+          <p:cNvPr id="21" name="Group 20"/>
+          <p:cNvGrpSpPr/>
+          <p:nvPr/>
+        </p:nvGrpSpPr>
+        <p:grpSpPr>
+          <a:xfrm>
+            <a:off x="6776307" y="1351750"/>
+            <a:ext cx="953461" cy="412838"/>
+            <a:chOff x="1447800" y="1295400"/>
+            <a:chExt cx="1332539" cy="1066800"/>
+          </a:xfrm>
+          <a:solidFill>
+            <a:srgbClr val="F3F2D2"/>
+          </a:solidFill>
+        </p:grpSpPr>
+        <p:sp>
+          <p:nvSpPr>
+            <p:cNvPr id="22" name="Rectangle 21"/>
+            <p:cNvSpPr/>
+            <p:nvPr/>
+          </p:nvSpPr>
+          <p:spPr>
+            <a:xfrm>
+              <a:off x="1447800" y="1295400"/>
+              <a:ext cx="1295400" cy="1066800"/>
+            </a:xfrm>
+            <a:prstGeom prst="rect">
+              <a:avLst/>
+            </a:prstGeom>
+            <a:grpFill/>
+            <a:ln w="3175">
+              <a:solidFill>
+                <a:schemeClr val="tx1"/>
+              </a:solidFill>
+            </a:ln>
+          </p:spPr>
+          <p:style>
+            <a:lnRef idx="2">
+              <a:schemeClr val="accent1">
+                <a:shade val="50000"/>
+              </a:schemeClr>
+            </a:lnRef>
+            <a:fillRef idx="1">
+              <a:schemeClr val="accent1"/>
+            </a:fillRef>
+            <a:effectRef idx="0">
+              <a:schemeClr val="accent1"/>
+            </a:effectRef>
+            <a:fontRef idx="minor">
+              <a:schemeClr val="lt1"/>
+            </a:fontRef>
+          </p:style>
+          <p:txBody>
+            <a:bodyPr rtlCol="0" anchor="ctr"/>
+            <a:lstStyle/>
+            <a:p>
+              <a:pPr algn="ctr"/>
+              <a:endParaRPr lang="en-US">
+                <a:latin typeface="Segoe UI Light" panose="020B0502040204020203" pitchFamily="34" charset="0"/>
+              </a:endParaRPr>
+            </a:p>
+          </p:txBody>
+        </p:sp>
+        <p:sp>
+          <p:nvSpPr>
+            <p:cNvPr id="23" name="TextBox 22"/>
+            <p:cNvSpPr txBox="1"/>
+            <p:nvPr/>
+          </p:nvSpPr>
+          <p:spPr>
+            <a:xfrm>
+              <a:off x="1447800" y="1606169"/>
+              <a:ext cx="1332539" cy="457818"/>
+            </a:xfrm>
+            <a:prstGeom prst="rect">
+              <a:avLst/>
+            </a:prstGeom>
             <a:noFill/>
           </p:spPr>
           <p:txBody>
@@ -6115,7 +7047,108 @@
                 <a:rPr lang="en-US" sz="1100" dirty="0" smtClean="0">
                   <a:latin typeface="Segoe UI Light" panose="020B0502040204020203" pitchFamily="34" charset="0"/>
                 </a:rPr>
-                <a:t>Parsed Results</a:t>
+                <a:t>Zemanta</a:t>
+              </a:r>
+              <a:endParaRPr lang="en-US" sz="1100" dirty="0">
+                <a:latin typeface="Segoe UI Light" panose="020B0502040204020203" pitchFamily="34" charset="0"/>
+              </a:endParaRPr>
+            </a:p>
+          </p:txBody>
+        </p:sp>
+      </p:grpSp>
+      <p:grpSp>
+        <p:nvGrpSpPr>
+          <p:cNvPr id="24" name="Group 23"/>
+          <p:cNvGrpSpPr/>
+          <p:nvPr/>
+        </p:nvGrpSpPr>
+        <p:grpSpPr>
+          <a:xfrm>
+            <a:off x="6776307" y="1822683"/>
+            <a:ext cx="953460" cy="461572"/>
+            <a:chOff x="1447800" y="1295400"/>
+            <a:chExt cx="1332539" cy="1066800"/>
+          </a:xfrm>
+          <a:solidFill>
+            <a:srgbClr val="F3F2D2"/>
+          </a:solidFill>
+        </p:grpSpPr>
+        <p:sp>
+          <p:nvSpPr>
+            <p:cNvPr id="25" name="Rectangle 24"/>
+            <p:cNvSpPr/>
+            <p:nvPr/>
+          </p:nvSpPr>
+          <p:spPr>
+            <a:xfrm>
+              <a:off x="1447800" y="1295400"/>
+              <a:ext cx="1295400" cy="1066800"/>
+            </a:xfrm>
+            <a:prstGeom prst="rect">
+              <a:avLst/>
+            </a:prstGeom>
+            <a:grpFill/>
+            <a:ln w="3175">
+              <a:solidFill>
+                <a:schemeClr val="tx1"/>
+              </a:solidFill>
+            </a:ln>
+          </p:spPr>
+          <p:style>
+            <a:lnRef idx="2">
+              <a:schemeClr val="accent1">
+                <a:shade val="50000"/>
+              </a:schemeClr>
+            </a:lnRef>
+            <a:fillRef idx="1">
+              <a:schemeClr val="accent1"/>
+            </a:fillRef>
+            <a:effectRef idx="0">
+              <a:schemeClr val="accent1"/>
+            </a:effectRef>
+            <a:fontRef idx="minor">
+              <a:schemeClr val="lt1"/>
+            </a:fontRef>
+          </p:style>
+          <p:txBody>
+            <a:bodyPr rtlCol="0" anchor="ctr"/>
+            <a:lstStyle/>
+            <a:p>
+              <a:pPr algn="ctr"/>
+              <a:endParaRPr lang="en-US">
+                <a:latin typeface="Segoe UI Light" panose="020B0502040204020203" pitchFamily="34" charset="0"/>
+              </a:endParaRPr>
+            </a:p>
+          </p:txBody>
+        </p:sp>
+        <p:sp>
+          <p:nvSpPr>
+            <p:cNvPr id="27" name="TextBox 26"/>
+            <p:cNvSpPr txBox="1"/>
+            <p:nvPr/>
+          </p:nvSpPr>
+          <p:spPr>
+            <a:xfrm>
+              <a:off x="1447800" y="1606169"/>
+              <a:ext cx="1332539" cy="530221"/>
+            </a:xfrm>
+            <a:prstGeom prst="rect">
+              <a:avLst/>
+            </a:prstGeom>
+            <a:noFill/>
+          </p:spPr>
+          <p:txBody>
+            <a:bodyPr wrap="square" rtlCol="0">
+              <a:spAutoFit/>
+            </a:bodyPr>
+            <a:lstStyle/>
+            <a:p>
+              <a:pPr algn="ctr"/>
+              <a:r>
+                <a:rPr lang="en-US" sz="1100" dirty="0" smtClean="0">
+                  <a:latin typeface="Segoe UI Light" panose="020B0502040204020203" pitchFamily="34" charset="0"/>
+                </a:rPr>
+                <a:t>Alchemy</a:t>
               </a:r>
               <a:endParaRPr lang="en-US" sz="1100" dirty="0">
                 <a:latin typeface="Segoe UI Light" panose="020B0502040204020203" pitchFamily="34" charset="0"/>
@@ -6127,7 +7160,7 @@
     </p:spTree>
     <p:extLst>
       <p:ext uri="{BB962C8B-B14F-4D97-AF65-F5344CB8AC3E}">
-        <p14:creationId xmlns:p14="http://schemas.microsoft.com/office/powerpoint/2010/main" val="1565466361"/>
+        <p14:creationId xmlns:p14="http://schemas.microsoft.com/office/powerpoint/2010/main" val="521595368"/>
       </p:ext>
     </p:extLst>
   </p:cSld>

</xml_diff>